<commit_message>
Remove slides from layouts.pptx
</commit_message>
<xml_diff>
--- a/backend/engagements/powerpoint/layouts.pptx
+++ b/backend/engagements/powerpoint/layouts.pptx
@@ -5,14 +5,11 @@
     <p:sldMasterId id="2147483696" r:id="rId1"/>
   </p:sldMasterIdLst>
   <p:notesMasterIdLst>
-    <p:notesMasterId r:id="rId3"/>
+    <p:notesMasterId r:id="rId2"/>
   </p:notesMasterIdLst>
   <p:handoutMasterIdLst>
-    <p:handoutMasterId r:id="rId4"/>
+    <p:handoutMasterId r:id="rId3"/>
   </p:handoutMasterIdLst>
-  <p:sldIdLst>
-    <p:sldId id="257" r:id="rId2"/>
-  </p:sldIdLst>
   <p:sldSz cx="12192000" cy="6858000"/>
   <p:notesSz cx="6858000" cy="9144000"/>
   <p:defaultTextStyle>
@@ -114,6 +111,9 @@
     <p:ext uri="{EFAFB233-063F-42B5-8137-9DF3F51BA10A}">
       <p15:sldGuideLst xmlns:p15="http://schemas.microsoft.com/office/powerpoint/2012/main"/>
     </p:ext>
+    <p:ext uri="{2D200454-40CA-4A62-9FC3-DE9A4176ACB9}">
+      <p15:notesGuideLst xmlns:p15="http://schemas.microsoft.com/office/powerpoint/2012/main"/>
+    </p:ext>
   </p:extLst>
 </p:presentation>
 </file>
@@ -212,7 +212,7 @@
           <a:p>
             <a:fld id="{82610736-C058-2D4A-B29F-1CD4E84D6BD0}" type="datetimeFigureOut">
               <a:rPr lang="en-US" smtClean="0"/>
-              <a:t>3/12/25</a:t>
+              <a:t>3/18/25</a:t>
             </a:fld>
             <a:endParaRPr lang="en-US"/>
           </a:p>
@@ -389,7 +389,7 @@
           <a:p>
             <a:fld id="{870CC9C5-3247-4881-93EA-827EC4A1B973}" type="datetimeFigureOut">
               <a:rPr lang="en-GB" smtClean="0"/>
-              <a:t>12/03/2025</a:t>
+              <a:t>18/03/2025</a:t>
             </a:fld>
             <a:endParaRPr lang="en-GB"/>
           </a:p>
@@ -656,90 +656,6 @@
 </p:notesMaster>
 </file>
 
-<file path=ppt/notesSlides/notesSlide1.xml><?xml version="1.0" encoding="utf-8"?>
-<p:notes xmlns:a="http://schemas.openxmlformats.org/drawingml/2006/main" xmlns:r="http://schemas.openxmlformats.org/officeDocument/2006/relationships" xmlns:p="http://schemas.openxmlformats.org/presentationml/2006/main">
-  <p:cSld>
-    <p:spTree>
-      <p:nvGrpSpPr>
-        <p:cNvPr id="1" name=""/>
-        <p:cNvGrpSpPr/>
-        <p:nvPr/>
-      </p:nvGrpSpPr>
-      <p:grpSpPr>
-        <a:xfrm>
-          <a:off x="0" y="0"/>
-          <a:ext cx="0" cy="0"/>
-          <a:chOff x="0" y="0"/>
-          <a:chExt cx="0" cy="0"/>
-        </a:xfrm>
-      </p:grpSpPr>
-      <p:sp>
-        <p:nvSpPr>
-          <p:cNvPr id="2" name="Slide Image Placeholder 1"/>
-          <p:cNvSpPr>
-            <a:spLocks noGrp="1" noRot="1" noChangeAspect="1"/>
-          </p:cNvSpPr>
-          <p:nvPr>
-            <p:ph type="sldImg"/>
-          </p:nvPr>
-        </p:nvSpPr>
-        <p:spPr/>
-      </p:sp>
-      <p:sp>
-        <p:nvSpPr>
-          <p:cNvPr id="3" name="Notes Placeholder 2"/>
-          <p:cNvSpPr>
-            <a:spLocks noGrp="1"/>
-          </p:cNvSpPr>
-          <p:nvPr>
-            <p:ph type="body" idx="1"/>
-          </p:nvPr>
-        </p:nvSpPr>
-        <p:spPr/>
-        <p:txBody>
-          <a:bodyPr/>
-          <a:lstStyle/>
-          <a:p>
-            <a:endParaRPr lang="en-US"/>
-          </a:p>
-        </p:txBody>
-      </p:sp>
-      <p:sp>
-        <p:nvSpPr>
-          <p:cNvPr id="4" name="Slide Number Placeholder 3"/>
-          <p:cNvSpPr>
-            <a:spLocks noGrp="1"/>
-          </p:cNvSpPr>
-          <p:nvPr>
-            <p:ph type="sldNum" sz="quarter" idx="5"/>
-          </p:nvPr>
-        </p:nvSpPr>
-        <p:spPr/>
-        <p:txBody>
-          <a:bodyPr/>
-          <a:lstStyle/>
-          <a:p>
-            <a:fld id="{499EAAA0-C581-4DA3-9E16-75E19C04F896}" type="slidenum">
-              <a:rPr lang="en-GB" smtClean="0"/>
-              <a:t>1</a:t>
-            </a:fld>
-            <a:endParaRPr lang="en-GB"/>
-          </a:p>
-        </p:txBody>
-      </p:sp>
-    </p:spTree>
-    <p:extLst>
-      <p:ext uri="{BB962C8B-B14F-4D97-AF65-F5344CB8AC3E}">
-        <p14:creationId xmlns:p14="http://schemas.microsoft.com/office/powerpoint/2010/main" val="3528217161"/>
-      </p:ext>
-    </p:extLst>
-  </p:cSld>
-  <p:clrMapOvr>
-    <a:masterClrMapping/>
-  </p:clrMapOvr>
-</p:notes>
-</file>
-
 <file path=ppt/slideLayouts/slideLayout1.xml><?xml version="1.0" encoding="utf-8"?>
 <p:sldLayout xmlns:a="http://schemas.openxmlformats.org/drawingml/2006/main" xmlns:r="http://schemas.openxmlformats.org/officeDocument/2006/relationships" xmlns:p="http://schemas.openxmlformats.org/presentationml/2006/main" preserve="1" userDrawn="1">
   <p:cSld name="Default">
@@ -1086,7 +1002,7 @@
           <a:p>
             <a:fld id="{3B13688B-08D2-4869-814F-77D13FA477E7}" type="datetime1">
               <a:rPr lang="en-GB" smtClean="0"/>
-              <a:t>12/03/2025</a:t>
+              <a:t>18/03/2025</a:t>
             </a:fld>
             <a:endParaRPr lang="en-GB"/>
           </a:p>
@@ -1342,7 +1258,7 @@
           <a:p>
             <a:fld id="{A6167571-A7EE-46D1-89BA-B10F682DEF10}" type="datetime1">
               <a:rPr lang="en-GB" smtClean="0"/>
-              <a:t>12/03/2025</a:t>
+              <a:t>18/03/2025</a:t>
             </a:fld>
             <a:endParaRPr lang="en-GB"/>
           </a:p>
@@ -1870,168 +1786,6 @@
     </p:otherStyle>
   </p:txStyles>
 </p:sldMaster>
-</file>
-
-<file path=ppt/slides/slide1.xml><?xml version="1.0" encoding="utf-8"?>
-<p:sld xmlns:a="http://schemas.openxmlformats.org/drawingml/2006/main" xmlns:r="http://schemas.openxmlformats.org/officeDocument/2006/relationships" xmlns:p="http://schemas.openxmlformats.org/presentationml/2006/main">
-  <p:cSld>
-    <p:spTree>
-      <p:nvGrpSpPr>
-        <p:cNvPr id="1" name=""/>
-        <p:cNvGrpSpPr/>
-        <p:nvPr/>
-      </p:nvGrpSpPr>
-      <p:grpSpPr>
-        <a:xfrm>
-          <a:off x="0" y="0"/>
-          <a:ext cx="0" cy="0"/>
-          <a:chOff x="0" y="0"/>
-          <a:chExt cx="0" cy="0"/>
-        </a:xfrm>
-      </p:grpSpPr>
-      <p:sp>
-        <p:nvSpPr>
-          <p:cNvPr id="2" name="Title 1">
-            <a:extLst>
-              <a:ext uri="{FF2B5EF4-FFF2-40B4-BE49-F238E27FC236}">
-                <a16:creationId xmlns:a16="http://schemas.microsoft.com/office/drawing/2014/main" id="{9EAD1A81-7212-C206-39CC-25ED13F9BFFC}"/>
-              </a:ext>
-            </a:extLst>
-          </p:cNvPr>
-          <p:cNvSpPr>
-            <a:spLocks noGrp="1"/>
-          </p:cNvSpPr>
-          <p:nvPr>
-            <p:ph type="title"/>
-          </p:nvPr>
-        </p:nvSpPr>
-        <p:spPr/>
-        <p:txBody>
-          <a:bodyPr>
-            <a:normAutofit/>
-          </a:bodyPr>
-          <a:lstStyle/>
-          <a:p>
-            <a:r>
-              <a:rPr lang="en-GB" sz="3200" dirty="0"/>
-              <a:t>TITLE</a:t>
-            </a:r>
-          </a:p>
-        </p:txBody>
-      </p:sp>
-      <p:sp>
-        <p:nvSpPr>
-          <p:cNvPr id="5" name="Text Placeholder 4">
-            <a:extLst>
-              <a:ext uri="{FF2B5EF4-FFF2-40B4-BE49-F238E27FC236}">
-                <a16:creationId xmlns:a16="http://schemas.microsoft.com/office/drawing/2014/main" id="{96397FE7-0847-FC6B-2041-94B218AAC48A}"/>
-              </a:ext>
-            </a:extLst>
-          </p:cNvPr>
-          <p:cNvSpPr>
-            <a:spLocks noGrp="1"/>
-          </p:cNvSpPr>
-          <p:nvPr>
-            <p:ph type="body" idx="1"/>
-          </p:nvPr>
-        </p:nvSpPr>
-        <p:spPr>
-          <a:prstGeom prst="rect">
-            <a:avLst/>
-          </a:prstGeom>
-        </p:spPr>
-        <p:txBody>
-          <a:bodyPr/>
-          <a:lstStyle/>
-          <a:p>
-            <a:r>
-              <a:rPr lang="en-GB" sz="2000" dirty="0"/>
-              <a:t>TEXT</a:t>
-            </a:r>
-            <a:endParaRPr lang="en-GB" dirty="0"/>
-          </a:p>
-        </p:txBody>
-      </p:sp>
-      <p:sp>
-        <p:nvSpPr>
-          <p:cNvPr id="8" name="Text Placeholder 7">
-            <a:extLst>
-              <a:ext uri="{FF2B5EF4-FFF2-40B4-BE49-F238E27FC236}">
-                <a16:creationId xmlns:a16="http://schemas.microsoft.com/office/drawing/2014/main" id="{F05B0B58-A4AF-45C6-DC95-0EDA85CB58D0}"/>
-              </a:ext>
-            </a:extLst>
-          </p:cNvPr>
-          <p:cNvSpPr>
-            <a:spLocks noGrp="1"/>
-          </p:cNvSpPr>
-          <p:nvPr>
-            <p:ph type="body" sz="quarter" idx="13"/>
-          </p:nvPr>
-        </p:nvSpPr>
-        <p:spPr>
-          <a:prstGeom prst="rect">
-            <a:avLst/>
-          </a:prstGeom>
-        </p:spPr>
-        <p:txBody>
-          <a:bodyPr>
-            <a:normAutofit/>
-          </a:bodyPr>
-          <a:lstStyle/>
-          <a:p>
-            <a:r>
-              <a:rPr lang="en-GB" sz="2000" dirty="0"/>
-              <a:t>EMPLOYEES</a:t>
-            </a:r>
-          </a:p>
-        </p:txBody>
-      </p:sp>
-      <p:pic>
-        <p:nvPicPr>
-          <p:cNvPr id="6" name="Picture Placeholder 5" descr="Tree frog">
-            <a:extLst>
-              <a:ext uri="{FF2B5EF4-FFF2-40B4-BE49-F238E27FC236}">
-                <a16:creationId xmlns:a16="http://schemas.microsoft.com/office/drawing/2014/main" id="{5CDEDFBB-959E-279D-97CB-F744EF20307C}"/>
-              </a:ext>
-            </a:extLst>
-          </p:cNvPr>
-          <p:cNvPicPr>
-            <a:picLocks noGrp="1" noChangeAspect="1"/>
-          </p:cNvPicPr>
-          <p:nvPr>
-            <p:ph type="pic" idx="22"/>
-          </p:nvPr>
-        </p:nvPicPr>
-        <p:blipFill>
-          <a:blip r:embed="rId3">
-            <a:extLst>
-              <a:ext uri="{28A0092B-C50C-407E-A947-70E740481C1C}">
-                <a14:useLocalDpi xmlns:a14="http://schemas.microsoft.com/office/drawing/2010/main" val="0"/>
-              </a:ext>
-            </a:extLst>
-          </a:blip>
-          <a:srcRect t="17768" b="17768"/>
-          <a:stretch/>
-        </p:blipFill>
-        <p:spPr>
-          <a:prstGeom prst="roundRect">
-            <a:avLst>
-              <a:gd name="adj" fmla="val 0"/>
-            </a:avLst>
-          </a:prstGeom>
-        </p:spPr>
-      </p:pic>
-    </p:spTree>
-    <p:extLst>
-      <p:ext uri="{BB962C8B-B14F-4D97-AF65-F5344CB8AC3E}">
-        <p14:creationId xmlns:p14="http://schemas.microsoft.com/office/powerpoint/2010/main" val="433843589"/>
-      </p:ext>
-    </p:extLst>
-  </p:cSld>
-  <p:clrMapOvr>
-    <a:masterClrMapping/>
-  </p:clrMapOvr>
-</p:sld>
 </file>
 
 <file path=ppt/theme/theme1.xml><?xml version="1.0" encoding="utf-8"?>

</xml_diff>